<commit_message>
Use `fillMediaBag` in the writers that may need to get images.
`fillMediaBag` will properly search the resource path
using the `basename` (if present) if the image isn't found at its
path.

This change has some side effects:

- in ipynb, attachment names will now always be hashes
  (perhaps undesirable)?
- in docx, odt, and epub, duplication of images with the
  same content will automatically be avoided.
</commit_message>
<xml_diff>
--- a/test/pptx/images.pptx
+++ b/test/pptx/images.pptx
@@ -3115,7 +3115,7 @@
       </p:grpSpPr>
       <p:pic>
         <p:nvPicPr>
-          <p:cNvPr descr="lalune.jpg" id="0" name="Picture 1"/>
+          <p:cNvPr descr="f9d88c3dbe18f6a7f5670e994a947d51216cdf0e.jpg" id="0" name="Picture 1"/>
           <p:cNvPicPr>
             <a:picLocks noGrp="1" noChangeAspect="1"/>
           </p:cNvPicPr>
@@ -3167,7 +3167,7 @@
       </p:grpSpPr>
       <p:pic>
         <p:nvPicPr>
-          <p:cNvPr descr="lalune.jpg" id="0" name="Picture 1"/>
+          <p:cNvPr descr="f9d88c3dbe18f6a7f5670e994a947d51216cdf0e.jpg" id="0" name="Picture 1"/>
           <p:cNvPicPr>
             <a:picLocks noGrp="1" noChangeAspect="1"/>
           </p:cNvPicPr>
@@ -3290,7 +3290,7 @@
       </p:sp>
       <p:pic>
         <p:nvPicPr>
-          <p:cNvPr descr="lalune.jpg" id="0" name="Picture 1"/>
+          <p:cNvPr descr="f9d88c3dbe18f6a7f5670e994a947d51216cdf0e.jpg" id="0" name="Picture 1"/>
           <p:cNvPicPr>
             <a:picLocks noGrp="1" noChangeAspect="1"/>
           </p:cNvPicPr>

</xml_diff>

<commit_message>
pptx: Include image title in description
The image title (i.e. `![alt text](link "title")`) was previously
ignored when writing to pptx. This commit includes it in PowerPoint's
description of the image, along with the link (which was already
included).

Fixes 7352.
</commit_message>
<xml_diff>
--- a/test/pptx/images.pptx
+++ b/test/pptx/images.pptx
@@ -2587,7 +2587,7 @@
 </file>
 
 <file path=ppt/slideMasters/slideMaster1.xml><?xml version="1.0" encoding="utf-8"?>
-<p:sldMaster xmlns:a="http://schemas.openxmlformats.org/drawingml/2006/main" xmlns:r="http://schemas.openxmlformats.org/officeDocument/2006/relationships" xmlns:p="http://schemas.openxmlformats.org/presentationml/2006/main">
+<p:sldMaster xmlns:a="http://schemas.openxmlformats.org/drawingml/2006/main" xmlns:p="http://schemas.openxmlformats.org/presentationml/2006/main" xmlns:r="http://schemas.openxmlformats.org/officeDocument/2006/relationships">
   <p:cSld>
     <p:bg>
       <p:bgRef idx="1001">
@@ -2628,7 +2628,7 @@
           </a:prstGeom>
         </p:spPr>
         <p:txBody>
-          <a:bodyPr vert="horz" lIns="91440" tIns="45720" rIns="91440" bIns="45720" rtlCol="0" anchor="ctr">
+          <a:bodyPr anchor="ctr" bIns="45720" lIns="91440" rIns="91440" rtlCol="0" tIns="45720" vert="horz">
             <a:normAutofit/>
           </a:bodyPr>
           <a:lstStyle/>
@@ -2648,7 +2648,7 @@
             <a:spLocks noGrp="1"/>
           </p:cNvSpPr>
           <p:nvPr>
-            <p:ph type="body" idx="1"/>
+            <p:ph idx="1" type="body"/>
           </p:nvPr>
         </p:nvSpPr>
         <p:spPr>
@@ -2661,7 +2661,7 @@
           </a:prstGeom>
         </p:spPr>
         <p:txBody>
-          <a:bodyPr vert="horz" lIns="91440" tIns="45720" rIns="91440" bIns="45720" rtlCol="0">
+          <a:bodyPr bIns="45720" lIns="91440" rIns="91440" rtlCol="0" tIns="45720" vert="horz">
             <a:normAutofit/>
           </a:bodyPr>
           <a:lstStyle/>
@@ -2710,7 +2710,7 @@
             <a:spLocks noGrp="1"/>
           </p:cNvSpPr>
           <p:nvPr>
-            <p:ph type="dt" sz="half" idx="2"/>
+            <p:ph idx="2" sz="half" type="dt"/>
           </p:nvPr>
         </p:nvSpPr>
         <p:spPr>
@@ -2723,7 +2723,7 @@
           </a:prstGeom>
         </p:spPr>
         <p:txBody>
-          <a:bodyPr vert="horz" lIns="91440" tIns="45720" rIns="91440" bIns="45720" rtlCol="0" anchor="ctr"/>
+          <a:bodyPr anchor="ctr" bIns="45720" lIns="91440" rIns="91440" rtlCol="0" tIns="45720" vert="horz"/>
           <a:lstStyle>
             <a:lvl1pPr algn="l">
               <a:defRPr sz="1200">
@@ -2751,7 +2751,7 @@
             <a:spLocks noGrp="1"/>
           </p:cNvSpPr>
           <p:nvPr>
-            <p:ph type="ftr" sz="quarter" idx="3"/>
+            <p:ph idx="3" sz="quarter" type="ftr"/>
           </p:nvPr>
         </p:nvSpPr>
         <p:spPr>
@@ -2764,7 +2764,7 @@
           </a:prstGeom>
         </p:spPr>
         <p:txBody>
-          <a:bodyPr vert="horz" lIns="91440" tIns="45720" rIns="91440" bIns="45720" rtlCol="0" anchor="ctr"/>
+          <a:bodyPr anchor="ctr" bIns="45720" lIns="91440" rIns="91440" rtlCol="0" tIns="45720" vert="horz"/>
           <a:lstStyle>
             <a:lvl1pPr algn="ctr">
               <a:defRPr sz="1200">
@@ -2788,7 +2788,7 @@
             <a:spLocks noGrp="1"/>
           </p:cNvSpPr>
           <p:nvPr>
-            <p:ph type="sldNum" sz="quarter" idx="4"/>
+            <p:ph idx="4" sz="quarter" type="sldNum"/>
           </p:nvPr>
         </p:nvSpPr>
         <p:spPr>
@@ -2801,7 +2801,7 @@
           </a:prstGeom>
         </p:spPr>
         <p:txBody>
-          <a:bodyPr vert="horz" lIns="91440" tIns="45720" rIns="91440" bIns="45720" rtlCol="0" anchor="ctr"/>
+          <a:bodyPr anchor="ctr" bIns="45720" lIns="91440" rIns="91440" rtlCol="0" tIns="45720" vert="horz"/>
           <a:lstStyle>
             <a:lvl1pPr algn="r">
               <a:defRPr sz="1200">
@@ -2829,7 +2829,7 @@
       </p:ext>
     </p:extLst>
   </p:cSld>
-  <p:clrMap bg1="lt1" tx1="dk1" bg2="lt2" tx2="dk2" accent1="accent1" accent2="accent2" accent3="accent3" accent4="accent4" accent5="accent5" accent6="accent6" hlink="hlink" folHlink="folHlink"/>
+  <p:clrMap accent1="accent1" accent2="accent2" accent3="accent3" accent4="accent4" accent5="accent5" accent6="accent6" bg1="lt1" bg2="lt2" folHlink="folHlink" hlink="hlink" tx1="dk1" tx2="dk2"/>
   <p:sldLayoutIdLst>
     <p:sldLayoutId id="2147483649" r:id="rId1"/>
     <p:sldLayoutId id="2147483650" r:id="rId2"/>
@@ -2845,12 +2845,12 @@
   </p:sldLayoutIdLst>
   <p:txStyles>
     <p:titleStyle>
-      <a:lvl1pPr algn="ctr" defTabSz="457200" rtl="0" eaLnBrk="1" latinLnBrk="0" hangingPunct="1">
+      <a:lvl1pPr algn="ctr" defTabSz="457200" eaLnBrk="1" hangingPunct="1" latinLnBrk="0" rtl="0">
         <a:spcBef>
           <a:spcPct val="0"/>
         </a:spcBef>
         <a:buNone/>
-        <a:defRPr sz="4400" kern="1200">
+        <a:defRPr kern="1200" sz="4400">
           <a:solidFill>
             <a:schemeClr val="tx1"/>
           </a:solidFill>
@@ -2861,13 +2861,13 @@
       </a:lvl1pPr>
     </p:titleStyle>
     <p:bodyStyle>
-      <a:lvl1pPr marL="342900" indent="-342900" algn="l" defTabSz="457200" rtl="0" eaLnBrk="1" latinLnBrk="0" hangingPunct="1">
+      <a:lvl1pPr algn="l" defTabSz="457200" eaLnBrk="1" hangingPunct="1" indent="-342900" latinLnBrk="0" marL="342900" rtl="0">
         <a:spcBef>
           <a:spcPct val="20000"/>
         </a:spcBef>
         <a:buFont typeface="Arial"/>
         <a:buChar char="•"/>
-        <a:defRPr sz="3200" kern="1200">
+        <a:defRPr kern="1200" sz="3200">
           <a:solidFill>
             <a:schemeClr val="tx1"/>
           </a:solidFill>
@@ -2876,13 +2876,13 @@
           <a:cs typeface="+mn-cs"/>
         </a:defRPr>
       </a:lvl1pPr>
-      <a:lvl2pPr marL="742950" indent="-285750" algn="l" defTabSz="457200" rtl="0" eaLnBrk="1" latinLnBrk="0" hangingPunct="1">
+      <a:lvl2pPr algn="l" defTabSz="457200" eaLnBrk="1" hangingPunct="1" indent="-285750" latinLnBrk="0" marL="742950" rtl="0">
         <a:spcBef>
           <a:spcPct val="20000"/>
         </a:spcBef>
         <a:buFont typeface="Arial"/>
         <a:buChar char="–"/>
-        <a:defRPr sz="2800" kern="1200">
+        <a:defRPr kern="1200" sz="2800">
           <a:solidFill>
             <a:schemeClr val="tx1"/>
           </a:solidFill>
@@ -2891,13 +2891,13 @@
           <a:cs typeface="+mn-cs"/>
         </a:defRPr>
       </a:lvl2pPr>
-      <a:lvl3pPr marL="1143000" indent="-228600" algn="l" defTabSz="457200" rtl="0" eaLnBrk="1" latinLnBrk="0" hangingPunct="1">
+      <a:lvl3pPr algn="l" defTabSz="457200" eaLnBrk="1" hangingPunct="1" indent="-228600" latinLnBrk="0" marL="1143000" rtl="0">
         <a:spcBef>
           <a:spcPct val="20000"/>
         </a:spcBef>
         <a:buFont typeface="Arial"/>
         <a:buChar char="•"/>
-        <a:defRPr sz="2400" kern="1200">
+        <a:defRPr kern="1200" sz="2400">
           <a:solidFill>
             <a:schemeClr val="tx1"/>
           </a:solidFill>
@@ -2906,13 +2906,13 @@
           <a:cs typeface="+mn-cs"/>
         </a:defRPr>
       </a:lvl3pPr>
-      <a:lvl4pPr marL="1600200" indent="-228600" algn="l" defTabSz="457200" rtl="0" eaLnBrk="1" latinLnBrk="0" hangingPunct="1">
+      <a:lvl4pPr algn="l" defTabSz="457200" eaLnBrk="1" hangingPunct="1" indent="-228600" latinLnBrk="0" marL="1600200" rtl="0">
         <a:spcBef>
           <a:spcPct val="20000"/>
         </a:spcBef>
         <a:buFont typeface="Arial"/>
         <a:buChar char="–"/>
-        <a:defRPr sz="2000" kern="1200">
+        <a:defRPr kern="1200" sz="2000">
           <a:solidFill>
             <a:schemeClr val="tx1"/>
           </a:solidFill>
@@ -2921,13 +2921,13 @@
           <a:cs typeface="+mn-cs"/>
         </a:defRPr>
       </a:lvl4pPr>
-      <a:lvl5pPr marL="2057400" indent="-228600" algn="l" defTabSz="457200" rtl="0" eaLnBrk="1" latinLnBrk="0" hangingPunct="1">
+      <a:lvl5pPr algn="l" defTabSz="457200" eaLnBrk="1" hangingPunct="1" indent="-228600" latinLnBrk="0" marL="2057400" rtl="0">
         <a:spcBef>
           <a:spcPct val="20000"/>
         </a:spcBef>
         <a:buFont typeface="Arial"/>
         <a:buChar char="»"/>
-        <a:defRPr sz="2000" kern="1200">
+        <a:defRPr kern="1200" sz="2000">
           <a:solidFill>
             <a:schemeClr val="tx1"/>
           </a:solidFill>
@@ -2936,13 +2936,13 @@
           <a:cs typeface="+mn-cs"/>
         </a:defRPr>
       </a:lvl5pPr>
-      <a:lvl6pPr marL="2514600" indent="-228600" algn="l" defTabSz="457200" rtl="0" eaLnBrk="1" latinLnBrk="0" hangingPunct="1">
+      <a:lvl6pPr algn="l" defTabSz="457200" eaLnBrk="1" hangingPunct="1" indent="-228600" latinLnBrk="0" marL="2514600" rtl="0">
         <a:spcBef>
           <a:spcPct val="20000"/>
         </a:spcBef>
         <a:buFont typeface="Arial"/>
         <a:buChar char="•"/>
-        <a:defRPr sz="2000" kern="1200">
+        <a:defRPr kern="1200" sz="2000">
           <a:solidFill>
             <a:schemeClr val="tx1"/>
           </a:solidFill>
@@ -2951,13 +2951,13 @@
           <a:cs typeface="+mn-cs"/>
         </a:defRPr>
       </a:lvl6pPr>
-      <a:lvl7pPr marL="2971800" indent="-228600" algn="l" defTabSz="457200" rtl="0" eaLnBrk="1" latinLnBrk="0" hangingPunct="1">
+      <a:lvl7pPr algn="l" defTabSz="457200" eaLnBrk="1" hangingPunct="1" indent="-228600" latinLnBrk="0" marL="2971800" rtl="0">
         <a:spcBef>
           <a:spcPct val="20000"/>
         </a:spcBef>
         <a:buFont typeface="Arial"/>
         <a:buChar char="•"/>
-        <a:defRPr sz="2000" kern="1200">
+        <a:defRPr kern="1200" sz="2000">
           <a:solidFill>
             <a:schemeClr val="tx1"/>
           </a:solidFill>
@@ -2966,13 +2966,13 @@
           <a:cs typeface="+mn-cs"/>
         </a:defRPr>
       </a:lvl7pPr>
-      <a:lvl8pPr marL="3429000" indent="-228600" algn="l" defTabSz="457200" rtl="0" eaLnBrk="1" latinLnBrk="0" hangingPunct="1">
+      <a:lvl8pPr algn="l" defTabSz="457200" eaLnBrk="1" hangingPunct="1" indent="-228600" latinLnBrk="0" marL="3429000" rtl="0">
         <a:spcBef>
           <a:spcPct val="20000"/>
         </a:spcBef>
         <a:buFont typeface="Arial"/>
         <a:buChar char="•"/>
-        <a:defRPr sz="2000" kern="1200">
+        <a:defRPr kern="1200" sz="2000">
           <a:solidFill>
             <a:schemeClr val="tx1"/>
           </a:solidFill>
@@ -2981,13 +2981,13 @@
           <a:cs typeface="+mn-cs"/>
         </a:defRPr>
       </a:lvl8pPr>
-      <a:lvl9pPr marL="3886200" indent="-228600" algn="l" defTabSz="457200" rtl="0" eaLnBrk="1" latinLnBrk="0" hangingPunct="1">
+      <a:lvl9pPr algn="l" defTabSz="457200" eaLnBrk="1" hangingPunct="1" indent="-228600" latinLnBrk="0" marL="3886200" rtl="0">
         <a:spcBef>
           <a:spcPct val="20000"/>
         </a:spcBef>
         <a:buFont typeface="Arial"/>
         <a:buChar char="•"/>
-        <a:defRPr sz="2000" kern="1200">
+        <a:defRPr kern="1200" sz="2000">
           <a:solidFill>
             <a:schemeClr val="tx1"/>
           </a:solidFill>
@@ -3001,8 +3001,8 @@
       <a:defPPr>
         <a:defRPr lang="en-US"/>
       </a:defPPr>
-      <a:lvl1pPr marL="0" algn="l" defTabSz="457200" rtl="0" eaLnBrk="1" latinLnBrk="0" hangingPunct="1">
-        <a:defRPr sz="1800" kern="1200">
+      <a:lvl1pPr algn="l" defTabSz="457200" eaLnBrk="1" hangingPunct="1" latinLnBrk="0" marL="0" rtl="0">
+        <a:defRPr kern="1200" sz="1800">
           <a:solidFill>
             <a:schemeClr val="tx1"/>
           </a:solidFill>
@@ -3011,8 +3011,8 @@
           <a:cs typeface="+mn-cs"/>
         </a:defRPr>
       </a:lvl1pPr>
-      <a:lvl2pPr marL="457200" algn="l" defTabSz="457200" rtl="0" eaLnBrk="1" latinLnBrk="0" hangingPunct="1">
-        <a:defRPr sz="1800" kern="1200">
+      <a:lvl2pPr algn="l" defTabSz="457200" eaLnBrk="1" hangingPunct="1" latinLnBrk="0" marL="457200" rtl="0">
+        <a:defRPr kern="1200" sz="1800">
           <a:solidFill>
             <a:schemeClr val="tx1"/>
           </a:solidFill>
@@ -3021,8 +3021,8 @@
           <a:cs typeface="+mn-cs"/>
         </a:defRPr>
       </a:lvl2pPr>
-      <a:lvl3pPr marL="914400" algn="l" defTabSz="457200" rtl="0" eaLnBrk="1" latinLnBrk="0" hangingPunct="1">
-        <a:defRPr sz="1800" kern="1200">
+      <a:lvl3pPr algn="l" defTabSz="457200" eaLnBrk="1" hangingPunct="1" latinLnBrk="0" marL="914400" rtl="0">
+        <a:defRPr kern="1200" sz="1800">
           <a:solidFill>
             <a:schemeClr val="tx1"/>
           </a:solidFill>
@@ -3031,8 +3031,8 @@
           <a:cs typeface="+mn-cs"/>
         </a:defRPr>
       </a:lvl3pPr>
-      <a:lvl4pPr marL="1371600" algn="l" defTabSz="457200" rtl="0" eaLnBrk="1" latinLnBrk="0" hangingPunct="1">
-        <a:defRPr sz="1800" kern="1200">
+      <a:lvl4pPr algn="l" defTabSz="457200" eaLnBrk="1" hangingPunct="1" latinLnBrk="0" marL="1371600" rtl="0">
+        <a:defRPr kern="1200" sz="1800">
           <a:solidFill>
             <a:schemeClr val="tx1"/>
           </a:solidFill>
@@ -3041,8 +3041,8 @@
           <a:cs typeface="+mn-cs"/>
         </a:defRPr>
       </a:lvl4pPr>
-      <a:lvl5pPr marL="1828800" algn="l" defTabSz="457200" rtl="0" eaLnBrk="1" latinLnBrk="0" hangingPunct="1">
-        <a:defRPr sz="1800" kern="1200">
+      <a:lvl5pPr algn="l" defTabSz="457200" eaLnBrk="1" hangingPunct="1" latinLnBrk="0" marL="1828800" rtl="0">
+        <a:defRPr kern="1200" sz="1800">
           <a:solidFill>
             <a:schemeClr val="tx1"/>
           </a:solidFill>
@@ -3051,8 +3051,8 @@
           <a:cs typeface="+mn-cs"/>
         </a:defRPr>
       </a:lvl5pPr>
-      <a:lvl6pPr marL="2286000" algn="l" defTabSz="457200" rtl="0" eaLnBrk="1" latinLnBrk="0" hangingPunct="1">
-        <a:defRPr sz="1800" kern="1200">
+      <a:lvl6pPr algn="l" defTabSz="457200" eaLnBrk="1" hangingPunct="1" latinLnBrk="0" marL="2286000" rtl="0">
+        <a:defRPr kern="1200" sz="1800">
           <a:solidFill>
             <a:schemeClr val="tx1"/>
           </a:solidFill>
@@ -3061,8 +3061,8 @@
           <a:cs typeface="+mn-cs"/>
         </a:defRPr>
       </a:lvl6pPr>
-      <a:lvl7pPr marL="2743200" algn="l" defTabSz="457200" rtl="0" eaLnBrk="1" latinLnBrk="0" hangingPunct="1">
-        <a:defRPr sz="1800" kern="1200">
+      <a:lvl7pPr algn="l" defTabSz="457200" eaLnBrk="1" hangingPunct="1" latinLnBrk="0" marL="2743200" rtl="0">
+        <a:defRPr kern="1200" sz="1800">
           <a:solidFill>
             <a:schemeClr val="tx1"/>
           </a:solidFill>
@@ -3071,8 +3071,8 @@
           <a:cs typeface="+mn-cs"/>
         </a:defRPr>
       </a:lvl7pPr>
-      <a:lvl8pPr marL="3200400" algn="l" defTabSz="457200" rtl="0" eaLnBrk="1" latinLnBrk="0" hangingPunct="1">
-        <a:defRPr sz="1800" kern="1200">
+      <a:lvl8pPr algn="l" defTabSz="457200" eaLnBrk="1" hangingPunct="1" latinLnBrk="0" marL="3200400" rtl="0">
+        <a:defRPr kern="1200" sz="1800">
           <a:solidFill>
             <a:schemeClr val="tx1"/>
           </a:solidFill>
@@ -3081,8 +3081,8 @@
           <a:cs typeface="+mn-cs"/>
         </a:defRPr>
       </a:lvl8pPr>
-      <a:lvl9pPr marL="3657600" algn="l" defTabSz="457200" rtl="0" eaLnBrk="1" latinLnBrk="0" hangingPunct="1">
-        <a:defRPr sz="1800" kern="1200">
+      <a:lvl9pPr algn="l" defTabSz="457200" eaLnBrk="1" hangingPunct="1" latinLnBrk="0" marL="3657600" rtl="0">
+        <a:defRPr kern="1200" sz="1800">
           <a:solidFill>
             <a:schemeClr val="tx1"/>
           </a:solidFill>
@@ -3167,7 +3167,7 @@
       </p:grpSpPr>
       <p:pic>
         <p:nvPicPr>
-          <p:cNvPr descr="lalune.jpg" id="0" name="Picture 1"/>
+          <p:cNvPr descr="fig:  lalune.jpg" id="0" name="Picture 1"/>
           <p:cNvPicPr>
             <a:picLocks noGrp="1" noChangeAspect="1"/>
           </p:cNvPicPr>
@@ -3290,7 +3290,7 @@
       </p:sp>
       <p:pic>
         <p:nvPicPr>
-          <p:cNvPr descr="lalune.jpg" id="0" name="Picture 1"/>
+          <p:cNvPr descr="fig:  lalune.jpg" id="0" name="Picture 1"/>
           <p:cNvPicPr>
             <a:picLocks noGrp="1" noChangeAspect="1"/>
           </p:cNvPicPr>

</xml_diff>